<commit_message>
Updated PPP, DG, and fixed printing inconsistencies for card bill
</commit_message>
<xml_diff>
--- a/docs/diagrams/CardExpenditureAndBillExample.pptx
+++ b/docs/diagrams/CardExpenditureAndBillExample.pptx
@@ -267,7 +267,7 @@
           <a:p>
             <a:fld id="{ABFC1131-6563-4557-B7B6-C2B0C43D5202}" type="datetimeFigureOut">
               <a:rPr lang="en-SG" smtClean="0"/>
-              <a:t>10/11/19</a:t>
+              <a:t>11/11/19</a:t>
             </a:fld>
             <a:endParaRPr lang="en-SG"/>
           </a:p>
@@ -467,7 +467,7 @@
           <a:p>
             <a:fld id="{ABFC1131-6563-4557-B7B6-C2B0C43D5202}" type="datetimeFigureOut">
               <a:rPr lang="en-SG" smtClean="0"/>
-              <a:t>10/11/19</a:t>
+              <a:t>11/11/19</a:t>
             </a:fld>
             <a:endParaRPr lang="en-SG"/>
           </a:p>
@@ -677,7 +677,7 @@
           <a:p>
             <a:fld id="{ABFC1131-6563-4557-B7B6-C2B0C43D5202}" type="datetimeFigureOut">
               <a:rPr lang="en-SG" smtClean="0"/>
-              <a:t>10/11/19</a:t>
+              <a:t>11/11/19</a:t>
             </a:fld>
             <a:endParaRPr lang="en-SG"/>
           </a:p>
@@ -877,7 +877,7 @@
           <a:p>
             <a:fld id="{ABFC1131-6563-4557-B7B6-C2B0C43D5202}" type="datetimeFigureOut">
               <a:rPr lang="en-SG" smtClean="0"/>
-              <a:t>10/11/19</a:t>
+              <a:t>11/11/19</a:t>
             </a:fld>
             <a:endParaRPr lang="en-SG"/>
           </a:p>
@@ -1153,7 +1153,7 @@
           <a:p>
             <a:fld id="{ABFC1131-6563-4557-B7B6-C2B0C43D5202}" type="datetimeFigureOut">
               <a:rPr lang="en-SG" smtClean="0"/>
-              <a:t>10/11/19</a:t>
+              <a:t>11/11/19</a:t>
             </a:fld>
             <a:endParaRPr lang="en-SG"/>
           </a:p>
@@ -1421,7 +1421,7 @@
           <a:p>
             <a:fld id="{ABFC1131-6563-4557-B7B6-C2B0C43D5202}" type="datetimeFigureOut">
               <a:rPr lang="en-SG" smtClean="0"/>
-              <a:t>10/11/19</a:t>
+              <a:t>11/11/19</a:t>
             </a:fld>
             <a:endParaRPr lang="en-SG"/>
           </a:p>
@@ -1836,7 +1836,7 @@
           <a:p>
             <a:fld id="{ABFC1131-6563-4557-B7B6-C2B0C43D5202}" type="datetimeFigureOut">
               <a:rPr lang="en-SG" smtClean="0"/>
-              <a:t>10/11/19</a:t>
+              <a:t>11/11/19</a:t>
             </a:fld>
             <a:endParaRPr lang="en-SG"/>
           </a:p>
@@ -1978,7 +1978,7 @@
           <a:p>
             <a:fld id="{ABFC1131-6563-4557-B7B6-C2B0C43D5202}" type="datetimeFigureOut">
               <a:rPr lang="en-SG" smtClean="0"/>
-              <a:t>10/11/19</a:t>
+              <a:t>11/11/19</a:t>
             </a:fld>
             <a:endParaRPr lang="en-SG"/>
           </a:p>
@@ -2091,7 +2091,7 @@
           <a:p>
             <a:fld id="{ABFC1131-6563-4557-B7B6-C2B0C43D5202}" type="datetimeFigureOut">
               <a:rPr lang="en-SG" smtClean="0"/>
-              <a:t>10/11/19</a:t>
+              <a:t>11/11/19</a:t>
             </a:fld>
             <a:endParaRPr lang="en-SG"/>
           </a:p>
@@ -2404,7 +2404,7 @@
           <a:p>
             <a:fld id="{ABFC1131-6563-4557-B7B6-C2B0C43D5202}" type="datetimeFigureOut">
               <a:rPr lang="en-SG" smtClean="0"/>
-              <a:t>10/11/19</a:t>
+              <a:t>11/11/19</a:t>
             </a:fld>
             <a:endParaRPr lang="en-SG"/>
           </a:p>
@@ -2693,7 +2693,7 @@
           <a:p>
             <a:fld id="{ABFC1131-6563-4557-B7B6-C2B0C43D5202}" type="datetimeFigureOut">
               <a:rPr lang="en-SG" smtClean="0"/>
-              <a:t>10/11/19</a:t>
+              <a:t>11/11/19</a:t>
             </a:fld>
             <a:endParaRPr lang="en-SG"/>
           </a:p>
@@ -2936,7 +2936,7 @@
           <a:p>
             <a:fld id="{ABFC1131-6563-4557-B7B6-C2B0C43D5202}" type="datetimeFigureOut">
               <a:rPr lang="en-SG" smtClean="0"/>
-              <a:t>10/11/19</a:t>
+              <a:t>11/11/19</a:t>
             </a:fld>
             <a:endParaRPr lang="en-SG"/>
           </a:p>
@@ -4747,10 +4747,10 @@
       </p:grpSpPr>
       <p:pic>
         <p:nvPicPr>
-          <p:cNvPr id="8" name="Picture 7">
-            <a:extLst>
-              <a:ext uri="{FF2B5EF4-FFF2-40B4-BE49-F238E27FC236}">
-                <a16:creationId xmlns:a16="http://schemas.microsoft.com/office/drawing/2014/main" id="{E7B9D101-7808-3D45-AE9B-8C33F4647144}"/>
+          <p:cNvPr id="5" name="Picture 4">
+            <a:extLst>
+              <a:ext uri="{FF2B5EF4-FFF2-40B4-BE49-F238E27FC236}">
+                <a16:creationId xmlns:a16="http://schemas.microsoft.com/office/drawing/2014/main" id="{DF7EE4A9-27E1-8C49-B44B-5AB28ECB36FF}"/>
               </a:ext>
             </a:extLst>
           </p:cNvPr>
@@ -4773,8 +4773,8 @@
         </p:blipFill>
         <p:spPr>
           <a:xfrm>
-            <a:off x="552450" y="831850"/>
-            <a:ext cx="11087100" cy="5194300"/>
+            <a:off x="566420" y="1000117"/>
+            <a:ext cx="11047730" cy="4542232"/>
           </a:xfrm>
           <a:prstGeom prst="rect">
             <a:avLst/>
@@ -4795,8 +4795,8 @@
         </p:nvSpPr>
         <p:spPr>
           <a:xfrm>
-            <a:off x="554990" y="3634740"/>
-            <a:ext cx="10680700" cy="2317653"/>
+            <a:off x="577850" y="3531870"/>
+            <a:ext cx="10680700" cy="1949049"/>
           </a:xfrm>
           <a:prstGeom prst="rect">
             <a:avLst/>
@@ -4849,7 +4849,7 @@
         </p:nvCxnSpPr>
         <p:spPr>
           <a:xfrm>
-            <a:off x="10221928" y="3178932"/>
+            <a:off x="10276187" y="3063154"/>
             <a:ext cx="1" cy="382051"/>
           </a:xfrm>
           <a:prstGeom prst="straightConnector1">
@@ -4891,7 +4891,7 @@
         </p:nvSpPr>
         <p:spPr>
           <a:xfrm>
-            <a:off x="9174583" y="2682977"/>
+            <a:off x="9228842" y="2567199"/>
             <a:ext cx="1552114" cy="461665"/>
           </a:xfrm>
           <a:prstGeom prst="rect">
@@ -4936,8 +4936,8 @@
         </p:nvSpPr>
         <p:spPr>
           <a:xfrm>
-            <a:off x="554990" y="3406139"/>
-            <a:ext cx="6897370" cy="204187"/>
+            <a:off x="577850" y="3317982"/>
+            <a:ext cx="6350997" cy="197282"/>
           </a:xfrm>
           <a:prstGeom prst="rect">
             <a:avLst/>
@@ -4990,7 +4990,7 @@
         </p:nvCxnSpPr>
         <p:spPr>
           <a:xfrm flipH="1">
-            <a:off x="6905993" y="3138357"/>
+            <a:off x="6928847" y="3034327"/>
             <a:ext cx="461638" cy="204187"/>
           </a:xfrm>
           <a:prstGeom prst="straightConnector1">
@@ -5032,7 +5032,7 @@
         </p:nvSpPr>
         <p:spPr>
           <a:xfrm>
-            <a:off x="7396299" y="2990085"/>
+            <a:off x="7419153" y="2886055"/>
             <a:ext cx="1362446" cy="276999"/>
           </a:xfrm>
           <a:prstGeom prst="rect">
@@ -5095,10 +5095,10 @@
       </p:grpSpPr>
       <p:pic>
         <p:nvPicPr>
-          <p:cNvPr id="3" name="Picture 2">
-            <a:extLst>
-              <a:ext uri="{FF2B5EF4-FFF2-40B4-BE49-F238E27FC236}">
-                <a16:creationId xmlns:a16="http://schemas.microsoft.com/office/drawing/2014/main" id="{33F72FEB-1A4A-4E47-934A-942A01E853BE}"/>
+          <p:cNvPr id="6" name="Picture 5">
+            <a:extLst>
+              <a:ext uri="{FF2B5EF4-FFF2-40B4-BE49-F238E27FC236}">
+                <a16:creationId xmlns:a16="http://schemas.microsoft.com/office/drawing/2014/main" id="{A394E5C9-84D5-F844-809A-5A55C063BE62}"/>
               </a:ext>
             </a:extLst>
           </p:cNvPr>
@@ -5121,8 +5121,8 @@
         </p:blipFill>
         <p:spPr>
           <a:xfrm>
-            <a:off x="558800" y="996950"/>
-            <a:ext cx="11074400" cy="4864100"/>
+            <a:off x="566420" y="996950"/>
+            <a:ext cx="11055350" cy="4592762"/>
           </a:xfrm>
           <a:prstGeom prst="rect">
             <a:avLst/>
@@ -5143,8 +5143,8 @@
         </p:nvSpPr>
         <p:spPr>
           <a:xfrm>
-            <a:off x="566420" y="3840480"/>
-            <a:ext cx="10680700" cy="1943100"/>
+            <a:off x="577849" y="3567326"/>
+            <a:ext cx="10817855" cy="1943100"/>
           </a:xfrm>
           <a:prstGeom prst="rect">
             <a:avLst/>
@@ -5197,7 +5197,7 @@
         </p:nvCxnSpPr>
         <p:spPr>
           <a:xfrm>
-            <a:off x="10366708" y="3323809"/>
+            <a:off x="10355278" y="3073832"/>
             <a:ext cx="1" cy="382051"/>
           </a:xfrm>
           <a:prstGeom prst="straightConnector1">
@@ -5239,7 +5239,7 @@
         </p:nvSpPr>
         <p:spPr>
           <a:xfrm>
-            <a:off x="9319363" y="2827854"/>
+            <a:off x="9307933" y="2577877"/>
             <a:ext cx="1552114" cy="461665"/>
           </a:xfrm>
           <a:prstGeom prst="rect">
@@ -5284,8 +5284,8 @@
         </p:nvSpPr>
         <p:spPr>
           <a:xfrm>
-            <a:off x="570230" y="3590917"/>
-            <a:ext cx="7167880" cy="226703"/>
+            <a:off x="579077" y="3353013"/>
+            <a:ext cx="6622359" cy="204187"/>
           </a:xfrm>
           <a:prstGeom prst="rect">
             <a:avLst/>
@@ -5338,7 +5338,7 @@
         </p:nvCxnSpPr>
         <p:spPr>
           <a:xfrm flipH="1">
-            <a:off x="7077443" y="3264113"/>
+            <a:off x="7043153" y="2998986"/>
             <a:ext cx="461638" cy="204187"/>
           </a:xfrm>
           <a:prstGeom prst="straightConnector1">
@@ -5380,7 +5380,7 @@
         </p:nvSpPr>
         <p:spPr>
           <a:xfrm>
-            <a:off x="7567749" y="3115841"/>
+            <a:off x="7533459" y="2850714"/>
             <a:ext cx="1362446" cy="276999"/>
           </a:xfrm>
           <a:prstGeom prst="rect">

</xml_diff>